<commit_message>
Folie und Weihnachtsquiz reuploaded
</commit_message>
<xml_diff>
--- a/Folie.pptx
+++ b/Folie.pptx
@@ -270,7 +270,7 @@
           <a:p>
             <a:fld id="{248AC4D0-153C-4DC6-9EB5-B389D986A3D0}" type="datetimeFigureOut">
               <a:rPr lang="de-DE" smtClean="0"/>
-              <a:t>09.12.2018</a:t>
+              <a:t>23.12.2018</a:t>
             </a:fld>
             <a:endParaRPr lang="de-DE"/>
           </a:p>
@@ -468,7 +468,7 @@
           <a:p>
             <a:fld id="{248AC4D0-153C-4DC6-9EB5-B389D986A3D0}" type="datetimeFigureOut">
               <a:rPr lang="de-DE" smtClean="0"/>
-              <a:t>09.12.2018</a:t>
+              <a:t>23.12.2018</a:t>
             </a:fld>
             <a:endParaRPr lang="de-DE"/>
           </a:p>
@@ -676,7 +676,7 @@
           <a:p>
             <a:fld id="{248AC4D0-153C-4DC6-9EB5-B389D986A3D0}" type="datetimeFigureOut">
               <a:rPr lang="de-DE" smtClean="0"/>
-              <a:t>09.12.2018</a:t>
+              <a:t>23.12.2018</a:t>
             </a:fld>
             <a:endParaRPr lang="de-DE"/>
           </a:p>
@@ -874,7 +874,7 @@
           <a:p>
             <a:fld id="{248AC4D0-153C-4DC6-9EB5-B389D986A3D0}" type="datetimeFigureOut">
               <a:rPr lang="de-DE" smtClean="0"/>
-              <a:t>09.12.2018</a:t>
+              <a:t>23.12.2018</a:t>
             </a:fld>
             <a:endParaRPr lang="de-DE"/>
           </a:p>
@@ -1149,7 +1149,7 @@
           <a:p>
             <a:fld id="{248AC4D0-153C-4DC6-9EB5-B389D986A3D0}" type="datetimeFigureOut">
               <a:rPr lang="de-DE" smtClean="0"/>
-              <a:t>09.12.2018</a:t>
+              <a:t>23.12.2018</a:t>
             </a:fld>
             <a:endParaRPr lang="de-DE"/>
           </a:p>
@@ -1414,7 +1414,7 @@
           <a:p>
             <a:fld id="{248AC4D0-153C-4DC6-9EB5-B389D986A3D0}" type="datetimeFigureOut">
               <a:rPr lang="de-DE" smtClean="0"/>
-              <a:t>09.12.2018</a:t>
+              <a:t>23.12.2018</a:t>
             </a:fld>
             <a:endParaRPr lang="de-DE"/>
           </a:p>
@@ -1826,7 +1826,7 @@
           <a:p>
             <a:fld id="{248AC4D0-153C-4DC6-9EB5-B389D986A3D0}" type="datetimeFigureOut">
               <a:rPr lang="de-DE" smtClean="0"/>
-              <a:t>09.12.2018</a:t>
+              <a:t>23.12.2018</a:t>
             </a:fld>
             <a:endParaRPr lang="de-DE"/>
           </a:p>
@@ -1967,7 +1967,7 @@
           <a:p>
             <a:fld id="{248AC4D0-153C-4DC6-9EB5-B389D986A3D0}" type="datetimeFigureOut">
               <a:rPr lang="de-DE" smtClean="0"/>
-              <a:t>09.12.2018</a:t>
+              <a:t>23.12.2018</a:t>
             </a:fld>
             <a:endParaRPr lang="de-DE"/>
           </a:p>
@@ -2080,7 +2080,7 @@
           <a:p>
             <a:fld id="{248AC4D0-153C-4DC6-9EB5-B389D986A3D0}" type="datetimeFigureOut">
               <a:rPr lang="de-DE" smtClean="0"/>
-              <a:t>09.12.2018</a:t>
+              <a:t>23.12.2018</a:t>
             </a:fld>
             <a:endParaRPr lang="de-DE"/>
           </a:p>
@@ -2391,7 +2391,7 @@
           <a:p>
             <a:fld id="{248AC4D0-153C-4DC6-9EB5-B389D986A3D0}" type="datetimeFigureOut">
               <a:rPr lang="de-DE" smtClean="0"/>
-              <a:t>09.12.2018</a:t>
+              <a:t>23.12.2018</a:t>
             </a:fld>
             <a:endParaRPr lang="de-DE"/>
           </a:p>
@@ -2679,7 +2679,7 @@
           <a:p>
             <a:fld id="{248AC4D0-153C-4DC6-9EB5-B389D986A3D0}" type="datetimeFigureOut">
               <a:rPr lang="de-DE" smtClean="0"/>
-              <a:t>09.12.2018</a:t>
+              <a:t>23.12.2018</a:t>
             </a:fld>
             <a:endParaRPr lang="de-DE"/>
           </a:p>
@@ -2920,7 +2920,7 @@
           <a:p>
             <a:fld id="{248AC4D0-153C-4DC6-9EB5-B389D986A3D0}" type="datetimeFigureOut">
               <a:rPr lang="de-DE" smtClean="0"/>
-              <a:t>09.12.2018</a:t>
+              <a:t>23.12.2018</a:t>
             </a:fld>
             <a:endParaRPr lang="de-DE"/>
           </a:p>
@@ -3386,8 +3386,8 @@
         </p:nvSpPr>
         <p:spPr>
           <a:xfrm rot="10800000">
-            <a:off x="2901908" y="4574113"/>
-            <a:ext cx="3244060" cy="707886"/>
+            <a:off x="2993940" y="4970953"/>
+            <a:ext cx="3060491" cy="707886"/>
           </a:xfrm>
           <a:prstGeom prst="rect">
             <a:avLst/>
@@ -3398,11 +3398,44 @@
           <a:bodyPr wrap="square" rtlCol="0">
             <a:spAutoFit/>
           </a:bodyPr>
-          <a:lstStyle/>
-          <a:p>
-            <a:r>
-              <a:rPr lang="de-DE" sz="4000" dirty="0"/>
-              <a:t>2. Jan-Hendrik</a:t>
+          <a:lstStyle>
+            <a:defPPr>
+              <a:defRPr lang="de-DE"/>
+            </a:defPPr>
+            <a:lvl1pPr>
+              <a:defRPr sz="2000" b="1">
+                <a:ln w="12700">
+                  <a:solidFill>
+                    <a:schemeClr val="accent5"/>
+                  </a:solidFill>
+                  <a:prstDash val="solid"/>
+                </a:ln>
+                <a:pattFill prst="ltDnDiag">
+                  <a:fgClr>
+                    <a:schemeClr val="accent5">
+                      <a:lumMod val="60000"/>
+                      <a:lumOff val="40000"/>
+                    </a:schemeClr>
+                  </a:fgClr>
+                  <a:bgClr>
+                    <a:schemeClr val="bg1"/>
+                  </a:bgClr>
+                </a:pattFill>
+              </a:defRPr>
+            </a:lvl1pPr>
+          </a:lstStyle>
+          <a:p>
+            <a:pPr algn="ctr"/>
+            <a:r>
+              <a:rPr lang="de-DE" dirty="0"/>
+              <a:t>2. Gedicht von</a:t>
+            </a:r>
+          </a:p>
+          <a:p>
+            <a:pPr algn="ctr"/>
+            <a:r>
+              <a:rPr lang="de-DE" dirty="0"/>
+              <a:t>Jan-Hendrik</a:t>
             </a:r>
           </a:p>
         </p:txBody>
@@ -3421,8 +3454,8 @@
         </p:nvSpPr>
         <p:spPr>
           <a:xfrm>
-            <a:off x="104690" y="963528"/>
-            <a:ext cx="2857350" cy="830997"/>
+            <a:off x="197770" y="1135002"/>
+            <a:ext cx="2857350" cy="400110"/>
           </a:xfrm>
           <a:prstGeom prst="rect">
             <a:avLst/>
@@ -3436,8 +3469,26 @@
           <a:lstStyle/>
           <a:p>
             <a:r>
-              <a:rPr lang="de-DE" sz="4800" dirty="0"/>
-              <a:t>4. Nicolas</a:t>
+              <a:rPr lang="de-DE" sz="2000" b="1" dirty="0">
+                <a:ln w="12700">
+                  <a:solidFill>
+                    <a:schemeClr val="accent5"/>
+                  </a:solidFill>
+                  <a:prstDash val="solid"/>
+                </a:ln>
+                <a:pattFill prst="ltDnDiag">
+                  <a:fgClr>
+                    <a:schemeClr val="accent5">
+                      <a:lumMod val="60000"/>
+                      <a:lumOff val="40000"/>
+                    </a:schemeClr>
+                  </a:fgClr>
+                  <a:bgClr>
+                    <a:schemeClr val="bg1"/>
+                  </a:bgClr>
+                </a:pattFill>
+              </a:rPr>
+              <a:t>4. Gedicht von Nicolas</a:t>
             </a:r>
           </a:p>
         </p:txBody>
@@ -3578,9 +3629,11 @@
               <a:avLst/>
             </a:prstGeom>
             <a:noFill/>
-            <a:ln>
+            <a:ln w="6350">
               <a:solidFill>
-                <a:schemeClr val="tx1"/>
+                <a:schemeClr val="bg1">
+                  <a:lumMod val="50000"/>
+                </a:schemeClr>
               </a:solidFill>
             </a:ln>
           </p:spPr>
@@ -3630,9 +3683,11 @@
               <a:avLst/>
             </a:prstGeom>
             <a:noFill/>
-            <a:ln>
+            <a:ln w="6350">
               <a:solidFill>
-                <a:schemeClr val="tx1"/>
+                <a:schemeClr val="bg1">
+                  <a:lumMod val="50000"/>
+                </a:schemeClr>
               </a:solidFill>
             </a:ln>
           </p:spPr>
@@ -3682,9 +3737,11 @@
               <a:avLst/>
             </a:prstGeom>
             <a:noFill/>
-            <a:ln>
+            <a:ln w="6350">
               <a:solidFill>
-                <a:schemeClr val="tx1"/>
+                <a:schemeClr val="bg1">
+                  <a:lumMod val="50000"/>
+                </a:schemeClr>
               </a:solidFill>
             </a:ln>
           </p:spPr>
@@ -3734,9 +3791,11 @@
               <a:avLst/>
             </a:prstGeom>
             <a:noFill/>
-            <a:ln>
+            <a:ln w="6350">
               <a:solidFill>
-                <a:schemeClr val="tx1"/>
+                <a:schemeClr val="bg1">
+                  <a:lumMod val="50000"/>
+                </a:schemeClr>
               </a:solidFill>
             </a:ln>
           </p:spPr>
@@ -3786,9 +3845,11 @@
               <a:avLst/>
             </a:prstGeom>
             <a:noFill/>
-            <a:ln>
+            <a:ln w="6350">
               <a:solidFill>
-                <a:schemeClr val="tx1"/>
+                <a:schemeClr val="bg1">
+                  <a:lumMod val="50000"/>
+                </a:schemeClr>
               </a:solidFill>
             </a:ln>
           </p:spPr>
@@ -3838,9 +3899,11 @@
               <a:avLst/>
             </a:prstGeom>
             <a:noFill/>
-            <a:ln>
+            <a:ln w="6350">
               <a:solidFill>
-                <a:schemeClr val="tx1"/>
+                <a:schemeClr val="bg1">
+                  <a:lumMod val="50000"/>
+                </a:schemeClr>
               </a:solidFill>
             </a:ln>
           </p:spPr>
@@ -3890,9 +3953,11 @@
               <a:avLst/>
             </a:prstGeom>
             <a:noFill/>
-            <a:ln>
+            <a:ln w="6350">
               <a:solidFill>
-                <a:schemeClr val="tx1"/>
+                <a:schemeClr val="bg1">
+                  <a:lumMod val="50000"/>
+                </a:schemeClr>
               </a:solidFill>
             </a:ln>
           </p:spPr>
@@ -3942,9 +4007,11 @@
               <a:avLst/>
             </a:prstGeom>
             <a:noFill/>
-            <a:ln>
+            <a:ln w="6350">
               <a:solidFill>
-                <a:schemeClr val="tx1"/>
+                <a:schemeClr val="bg1">
+                  <a:lumMod val="50000"/>
+                </a:schemeClr>
               </a:solidFill>
             </a:ln>
           </p:spPr>
@@ -4439,8 +4506,8 @@
         </p:nvSpPr>
         <p:spPr>
           <a:xfrm rot="10800000">
-            <a:off x="9045834" y="6317400"/>
-            <a:ext cx="3231840" cy="523220"/>
+            <a:off x="9045834" y="6378955"/>
+            <a:ext cx="3231840" cy="400110"/>
           </a:xfrm>
           <a:prstGeom prst="rect">
             <a:avLst/>
@@ -4455,7 +4522,7 @@
           <a:p>
             <a:pPr algn="ctr"/>
             <a:r>
-              <a:rPr lang="de-DE" sz="2800" b="1" cap="none" spc="0" dirty="0">
+              <a:rPr lang="de-DE" sz="2000" b="1" dirty="0">
                 <a:ln w="12700">
                   <a:solidFill>
                     <a:schemeClr val="accent5"/>
@@ -4473,7 +4540,6 @@
                     <a:schemeClr val="bg1"/>
                   </a:bgClr>
                 </a:pattFill>
-                <a:effectLst/>
               </a:rPr>
               <a:t>Inhaltsverzeichnis</a:t>
             </a:r>
@@ -5153,9 +5219,9 @@
           <p:nvPr/>
         </p:nvSpPr>
         <p:spPr>
-          <a:xfrm rot="2131271">
-            <a:off x="5932919" y="877432"/>
-            <a:ext cx="3333365" cy="646331"/>
+          <a:xfrm>
+            <a:off x="6105141" y="1135002"/>
+            <a:ext cx="3014954" cy="400110"/>
           </a:xfrm>
           <a:prstGeom prst="rect">
             <a:avLst/>
@@ -5163,53 +5229,34 @@
           <a:noFill/>
         </p:spPr>
         <p:txBody>
-          <a:bodyPr wrap="square" lIns="91440" tIns="45720" rIns="91440" bIns="45720">
+          <a:bodyPr wrap="square" rtlCol="0">
             <a:spAutoFit/>
           </a:bodyPr>
           <a:lstStyle/>
           <a:p>
             <a:pPr algn="ctr"/>
             <a:r>
-              <a:rPr lang="de-DE" sz="3600" b="1" dirty="0">
-                <a:ln w="9525">
+              <a:rPr lang="de-DE" sz="2000" b="1" dirty="0">
+                <a:ln w="12700">
                   <a:solidFill>
-                    <a:schemeClr val="bg1"/>
+                    <a:schemeClr val="accent5"/>
                   </a:solidFill>
                   <a:prstDash val="solid"/>
                 </a:ln>
-                <a:solidFill>
-                  <a:schemeClr val="accent5"/>
-                </a:solidFill>
-                <a:effectLst>
-                  <a:outerShdw blurRad="12700" dist="38100" dir="2700000" algn="tl" rotWithShape="0">
+                <a:pattFill prst="ltDnDiag">
+                  <a:fgClr>
                     <a:schemeClr val="accent5">
                       <a:lumMod val="60000"/>
                       <a:lumOff val="40000"/>
                     </a:schemeClr>
-                  </a:outerShdw>
-                </a:effectLst>
+                  </a:fgClr>
+                  <a:bgClr>
+                    <a:schemeClr val="bg1"/>
+                  </a:bgClr>
+                </a:pattFill>
               </a:rPr>
               <a:t>Weihnachtsquiz</a:t>
             </a:r>
-            <a:endParaRPr lang="de-DE" sz="3600" b="1" cap="none" spc="0" dirty="0">
-              <a:ln w="9525">
-                <a:solidFill>
-                  <a:schemeClr val="bg1"/>
-                </a:solidFill>
-                <a:prstDash val="solid"/>
-              </a:ln>
-              <a:solidFill>
-                <a:schemeClr val="accent5"/>
-              </a:solidFill>
-              <a:effectLst>
-                <a:outerShdw blurRad="12700" dist="38100" dir="2700000" algn="tl" rotWithShape="0">
-                  <a:schemeClr val="accent5">
-                    <a:lumMod val="60000"/>
-                    <a:lumOff val="40000"/>
-                  </a:schemeClr>
-                </a:outerShdw>
-              </a:effectLst>
-            </a:endParaRPr>
           </a:p>
         </p:txBody>
       </p:sp>
@@ -5227,8 +5274,8 @@
         </p:nvSpPr>
         <p:spPr>
           <a:xfrm>
-            <a:off x="6365588" y="2104767"/>
-            <a:ext cx="1777593" cy="646331"/>
+            <a:off x="6095999" y="2058599"/>
+            <a:ext cx="3046921" cy="707886"/>
           </a:xfrm>
           <a:prstGeom prst="rect">
             <a:avLst/>
@@ -5239,11 +5286,43 @@
           <a:bodyPr wrap="square" rtlCol="0">
             <a:spAutoFit/>
           </a:bodyPr>
-          <a:lstStyle/>
+          <a:lstStyle>
+            <a:defPPr>
+              <a:defRPr lang="de-DE"/>
+            </a:defPPr>
+            <a:lvl1pPr algn="ctr">
+              <a:defRPr sz="2000" b="1">
+                <a:ln w="12700">
+                  <a:solidFill>
+                    <a:schemeClr val="accent5"/>
+                  </a:solidFill>
+                  <a:prstDash val="solid"/>
+                </a:ln>
+                <a:pattFill prst="ltDnDiag">
+                  <a:fgClr>
+                    <a:schemeClr val="accent5">
+                      <a:lumMod val="60000"/>
+                      <a:lumOff val="40000"/>
+                    </a:schemeClr>
+                  </a:fgClr>
+                  <a:bgClr>
+                    <a:schemeClr val="bg1"/>
+                  </a:bgClr>
+                </a:pattFill>
+              </a:defRPr>
+            </a:lvl1pPr>
+          </a:lstStyle>
           <a:p>
             <a:r>
               <a:rPr lang="de-DE" dirty="0"/>
-              <a:t>Von Jan-Hendrik und Sarah</a:t>
+              <a:t>Von Jan-Hendrik </a:t>
+            </a:r>
+            <a:br>
+              <a:rPr lang="de-DE" dirty="0"/>
+            </a:br>
+            <a:r>
+              <a:rPr lang="de-DE" dirty="0"/>
+              <a:t>und Sarah</a:t>
             </a:r>
           </a:p>
         </p:txBody>

</xml_diff>